<commit_message>
The magnetic Setup scale
</commit_message>
<xml_diff>
--- a/journalWallFriction/pictures/pdf/MagneticSetup.pptx
+++ b/journalWallFriction/pictures/pdf/MagneticSetup.pptx
@@ -104,6 +104,11 @@
       </a:defRPr>
     </a:lvl9pPr>
   </p:defaultTextStyle>
+  <p:extLst>
+    <p:ext uri="{EFAFB233-063F-42B5-8137-9DF3F51BA10A}">
+      <p15:sldGuideLst xmlns:p15="http://schemas.microsoft.com/office/powerpoint/2012/main"/>
+    </p:ext>
+  </p:extLst>
 </p:presentation>
 </file>
 
@@ -238,7 +243,7 @@
           <a:p>
             <a:fld id="{E9AC45FD-CA02-D640-AFC4-4B68F68BD6F2}" type="datetimeFigureOut">
               <a:rPr lang="en-US" smtClean="0"/>
-              <a:t>5/1/18</a:t>
+              <a:t>5/8/18</a:t>
             </a:fld>
             <a:endParaRPr lang="en-US"/>
           </a:p>
@@ -408,7 +413,7 @@
           <a:p>
             <a:fld id="{E9AC45FD-CA02-D640-AFC4-4B68F68BD6F2}" type="datetimeFigureOut">
               <a:rPr lang="en-US" smtClean="0"/>
-              <a:t>5/1/18</a:t>
+              <a:t>5/8/18</a:t>
             </a:fld>
             <a:endParaRPr lang="en-US"/>
           </a:p>
@@ -588,7 +593,7 @@
           <a:p>
             <a:fld id="{E9AC45FD-CA02-D640-AFC4-4B68F68BD6F2}" type="datetimeFigureOut">
               <a:rPr lang="en-US" smtClean="0"/>
-              <a:t>5/1/18</a:t>
+              <a:t>5/8/18</a:t>
             </a:fld>
             <a:endParaRPr lang="en-US"/>
           </a:p>
@@ -758,7 +763,7 @@
           <a:p>
             <a:fld id="{E9AC45FD-CA02-D640-AFC4-4B68F68BD6F2}" type="datetimeFigureOut">
               <a:rPr lang="en-US" smtClean="0"/>
-              <a:t>5/1/18</a:t>
+              <a:t>5/8/18</a:t>
             </a:fld>
             <a:endParaRPr lang="en-US"/>
           </a:p>
@@ -1002,7 +1007,7 @@
           <a:p>
             <a:fld id="{E9AC45FD-CA02-D640-AFC4-4B68F68BD6F2}" type="datetimeFigureOut">
               <a:rPr lang="en-US" smtClean="0"/>
-              <a:t>5/1/18</a:t>
+              <a:t>5/8/18</a:t>
             </a:fld>
             <a:endParaRPr lang="en-US"/>
           </a:p>
@@ -1234,7 +1239,7 @@
           <a:p>
             <a:fld id="{E9AC45FD-CA02-D640-AFC4-4B68F68BD6F2}" type="datetimeFigureOut">
               <a:rPr lang="en-US" smtClean="0"/>
-              <a:t>5/1/18</a:t>
+              <a:t>5/8/18</a:t>
             </a:fld>
             <a:endParaRPr lang="en-US"/>
           </a:p>
@@ -1601,7 +1606,7 @@
           <a:p>
             <a:fld id="{E9AC45FD-CA02-D640-AFC4-4B68F68BD6F2}" type="datetimeFigureOut">
               <a:rPr lang="en-US" smtClean="0"/>
-              <a:t>5/1/18</a:t>
+              <a:t>5/8/18</a:t>
             </a:fld>
             <a:endParaRPr lang="en-US"/>
           </a:p>
@@ -1719,7 +1724,7 @@
           <a:p>
             <a:fld id="{E9AC45FD-CA02-D640-AFC4-4B68F68BD6F2}" type="datetimeFigureOut">
               <a:rPr lang="en-US" smtClean="0"/>
-              <a:t>5/1/18</a:t>
+              <a:t>5/8/18</a:t>
             </a:fld>
             <a:endParaRPr lang="en-US"/>
           </a:p>
@@ -1814,7 +1819,7 @@
           <a:p>
             <a:fld id="{E9AC45FD-CA02-D640-AFC4-4B68F68BD6F2}" type="datetimeFigureOut">
               <a:rPr lang="en-US" smtClean="0"/>
-              <a:t>5/1/18</a:t>
+              <a:t>5/8/18</a:t>
             </a:fld>
             <a:endParaRPr lang="en-US"/>
           </a:p>
@@ -2091,7 +2096,7 @@
           <a:p>
             <a:fld id="{E9AC45FD-CA02-D640-AFC4-4B68F68BD6F2}" type="datetimeFigureOut">
               <a:rPr lang="en-US" smtClean="0"/>
-              <a:t>5/1/18</a:t>
+              <a:t>5/8/18</a:t>
             </a:fld>
             <a:endParaRPr lang="en-US"/>
           </a:p>
@@ -2348,7 +2353,7 @@
           <a:p>
             <a:fld id="{E9AC45FD-CA02-D640-AFC4-4B68F68BD6F2}" type="datetimeFigureOut">
               <a:rPr lang="en-US" smtClean="0"/>
-              <a:t>5/1/18</a:t>
+              <a:t>5/8/18</a:t>
             </a:fld>
             <a:endParaRPr lang="en-US"/>
           </a:p>
@@ -2561,7 +2566,7 @@
           <a:p>
             <a:fld id="{E9AC45FD-CA02-D640-AFC4-4B68F68BD6F2}" type="datetimeFigureOut">
               <a:rPr lang="en-US" smtClean="0"/>
-              <a:t>5/1/18</a:t>
+              <a:t>5/8/18</a:t>
             </a:fld>
             <a:endParaRPr lang="en-US"/>
           </a:p>
@@ -3102,17 +3107,8 @@
               <a:rPr lang="en-US" sz="1500" dirty="0">
                 <a:latin typeface="Times" pitchFamily="2" charset="0"/>
               </a:rPr>
-              <a:t>c</a:t>
-            </a:r>
-            <a:r>
-              <a:rPr lang="en-US" sz="1500">
-                <a:latin typeface="Times" pitchFamily="2" charset="0"/>
-              </a:rPr>
-              <a:t>amera </a:t>
-            </a:r>
-            <a:endParaRPr lang="en-US" sz="1500" dirty="0">
-              <a:latin typeface="Times" pitchFamily="2" charset="0"/>
-            </a:endParaRPr>
+              <a:t>camera </a:t>
+            </a:r>
           </a:p>
         </p:txBody>
       </p:sp>
@@ -3186,6 +3182,84 @@
                 <a:latin typeface="Times" pitchFamily="2" charset="0"/>
               </a:rPr>
               <a:t>coil</a:t>
+            </a:r>
+          </a:p>
+        </p:txBody>
+      </p:sp>
+      <p:cxnSp>
+        <p:nvCxnSpPr>
+          <p:cNvPr id="3" name="Straight Connector 2">
+            <a:extLst>
+              <a:ext uri="{FF2B5EF4-FFF2-40B4-BE49-F238E27FC236}">
+                <a16:creationId xmlns:a16="http://schemas.microsoft.com/office/drawing/2014/main" id="{59EA2E0E-80B5-D342-8354-58EF96187CC5}"/>
+              </a:ext>
+            </a:extLst>
+          </p:cNvPr>
+          <p:cNvCxnSpPr/>
+          <p:nvPr/>
+        </p:nvCxnSpPr>
+        <p:spPr>
+          <a:xfrm>
+            <a:off x="3162586" y="540560"/>
+            <a:ext cx="412513" cy="0"/>
+          </a:xfrm>
+          <a:prstGeom prst="line">
+            <a:avLst/>
+          </a:prstGeom>
+          <a:ln w="38100">
+            <a:solidFill>
+              <a:schemeClr val="tx1"/>
+            </a:solidFill>
+          </a:ln>
+        </p:spPr>
+        <p:style>
+          <a:lnRef idx="1">
+            <a:schemeClr val="accent1"/>
+          </a:lnRef>
+          <a:fillRef idx="0">
+            <a:schemeClr val="accent1"/>
+          </a:fillRef>
+          <a:effectRef idx="0">
+            <a:schemeClr val="accent1"/>
+          </a:effectRef>
+          <a:fontRef idx="minor">
+            <a:schemeClr val="tx1"/>
+          </a:fontRef>
+        </p:style>
+      </p:cxnSp>
+      <p:sp>
+        <p:nvSpPr>
+          <p:cNvPr id="4" name="TextBox 3">
+            <a:extLst>
+              <a:ext uri="{FF2B5EF4-FFF2-40B4-BE49-F238E27FC236}">
+                <a16:creationId xmlns:a16="http://schemas.microsoft.com/office/drawing/2014/main" id="{645E3093-9656-AC40-A9B3-843589B5796E}"/>
+              </a:ext>
+            </a:extLst>
+          </p:cNvPr>
+          <p:cNvSpPr txBox="1"/>
+          <p:nvPr/>
+        </p:nvSpPr>
+        <p:spPr>
+          <a:xfrm>
+            <a:off x="3086956" y="268133"/>
+            <a:ext cx="625643" cy="323165"/>
+          </a:xfrm>
+          <a:prstGeom prst="rect">
+            <a:avLst/>
+          </a:prstGeom>
+          <a:noFill/>
+        </p:spPr>
+        <p:txBody>
+          <a:bodyPr wrap="square" rtlCol="0">
+            <a:spAutoFit/>
+          </a:bodyPr>
+          <a:lstStyle/>
+          <a:p>
+            <a:r>
+              <a:rPr lang="en-US" sz="1500" dirty="0">
+                <a:latin typeface="Times" pitchFamily="2" charset="0"/>
+              </a:rPr>
+              <a:t>5 cm</a:t>
             </a:r>
           </a:p>
         </p:txBody>

</xml_diff>